<commit_message>
Day 4 & 5
</commit_message>
<xml_diff>
--- a/Presentation/MCQ's.pptx
+++ b/Presentation/MCQ's.pptx
@@ -11,6 +11,15 @@
     <p:sldId id="258" r:id="rId5"/>
     <p:sldId id="259" r:id="rId6"/>
     <p:sldId id="260" r:id="rId7"/>
+    <p:sldId id="262" r:id="rId8"/>
+    <p:sldId id="263" r:id="rId9"/>
+    <p:sldId id="264" r:id="rId10"/>
+    <p:sldId id="265" r:id="rId11"/>
+    <p:sldId id="266" r:id="rId12"/>
+    <p:sldId id="267" r:id="rId13"/>
+    <p:sldId id="268" r:id="rId14"/>
+    <p:sldId id="269" r:id="rId15"/>
+    <p:sldId id="270" r:id="rId16"/>
   </p:sldIdLst>
   <p:sldSz cx="12192000" cy="6858000"/>
   <p:notesSz cx="6858000" cy="9144000"/>
@@ -109,6 +118,11 @@
       </a:defRPr>
     </a:lvl9pPr>
   </p:defaultTextStyle>
+  <p:extLst>
+    <p:ext uri="{EFAFB233-063F-42B5-8137-9DF3F51BA10A}">
+      <p15:sldGuideLst xmlns:p15="http://schemas.microsoft.com/office/powerpoint/2012/main"/>
+    </p:ext>
+  </p:extLst>
 </p:presentation>
 </file>
 
@@ -259,7 +273,7 @@
           <a:p>
             <a:fld id="{5D18DF3F-D54E-484E-889A-2AD7F8C273A7}" type="datetimeFigureOut">
               <a:rPr lang="en-US" smtClean="0"/>
-              <a:t>5/16/2024</a:t>
+              <a:t>5/17/2024</a:t>
             </a:fld>
             <a:endParaRPr lang="en-US"/>
           </a:p>
@@ -457,7 +471,7 @@
           <a:p>
             <a:fld id="{5D18DF3F-D54E-484E-889A-2AD7F8C273A7}" type="datetimeFigureOut">
               <a:rPr lang="en-US" smtClean="0"/>
-              <a:t>5/16/2024</a:t>
+              <a:t>5/17/2024</a:t>
             </a:fld>
             <a:endParaRPr lang="en-US"/>
           </a:p>
@@ -665,7 +679,7 @@
           <a:p>
             <a:fld id="{5D18DF3F-D54E-484E-889A-2AD7F8C273A7}" type="datetimeFigureOut">
               <a:rPr lang="en-US" smtClean="0"/>
-              <a:t>5/16/2024</a:t>
+              <a:t>5/17/2024</a:t>
             </a:fld>
             <a:endParaRPr lang="en-US"/>
           </a:p>
@@ -863,7 +877,7 @@
           <a:p>
             <a:fld id="{5D18DF3F-D54E-484E-889A-2AD7F8C273A7}" type="datetimeFigureOut">
               <a:rPr lang="en-US" smtClean="0"/>
-              <a:t>5/16/2024</a:t>
+              <a:t>5/17/2024</a:t>
             </a:fld>
             <a:endParaRPr lang="en-US"/>
           </a:p>
@@ -1138,7 +1152,7 @@
           <a:p>
             <a:fld id="{5D18DF3F-D54E-484E-889A-2AD7F8C273A7}" type="datetimeFigureOut">
               <a:rPr lang="en-US" smtClean="0"/>
-              <a:t>5/16/2024</a:t>
+              <a:t>5/17/2024</a:t>
             </a:fld>
             <a:endParaRPr lang="en-US"/>
           </a:p>
@@ -1403,7 +1417,7 @@
           <a:p>
             <a:fld id="{5D18DF3F-D54E-484E-889A-2AD7F8C273A7}" type="datetimeFigureOut">
               <a:rPr lang="en-US" smtClean="0"/>
-              <a:t>5/16/2024</a:t>
+              <a:t>5/17/2024</a:t>
             </a:fld>
             <a:endParaRPr lang="en-US"/>
           </a:p>
@@ -1815,7 +1829,7 @@
           <a:p>
             <a:fld id="{5D18DF3F-D54E-484E-889A-2AD7F8C273A7}" type="datetimeFigureOut">
               <a:rPr lang="en-US" smtClean="0"/>
-              <a:t>5/16/2024</a:t>
+              <a:t>5/17/2024</a:t>
             </a:fld>
             <a:endParaRPr lang="en-US"/>
           </a:p>
@@ -1956,7 +1970,7 @@
           <a:p>
             <a:fld id="{5D18DF3F-D54E-484E-889A-2AD7F8C273A7}" type="datetimeFigureOut">
               <a:rPr lang="en-US" smtClean="0"/>
-              <a:t>5/16/2024</a:t>
+              <a:t>5/17/2024</a:t>
             </a:fld>
             <a:endParaRPr lang="en-US"/>
           </a:p>
@@ -2069,7 +2083,7 @@
           <a:p>
             <a:fld id="{5D18DF3F-D54E-484E-889A-2AD7F8C273A7}" type="datetimeFigureOut">
               <a:rPr lang="en-US" smtClean="0"/>
-              <a:t>5/16/2024</a:t>
+              <a:t>5/17/2024</a:t>
             </a:fld>
             <a:endParaRPr lang="en-US"/>
           </a:p>
@@ -2380,7 +2394,7 @@
           <a:p>
             <a:fld id="{5D18DF3F-D54E-484E-889A-2AD7F8C273A7}" type="datetimeFigureOut">
               <a:rPr lang="en-US" smtClean="0"/>
-              <a:t>5/16/2024</a:t>
+              <a:t>5/17/2024</a:t>
             </a:fld>
             <a:endParaRPr lang="en-US"/>
           </a:p>
@@ -2668,7 +2682,7 @@
           <a:p>
             <a:fld id="{5D18DF3F-D54E-484E-889A-2AD7F8C273A7}" type="datetimeFigureOut">
               <a:rPr lang="en-US" smtClean="0"/>
-              <a:t>5/16/2024</a:t>
+              <a:t>5/17/2024</a:t>
             </a:fld>
             <a:endParaRPr lang="en-US"/>
           </a:p>
@@ -2909,7 +2923,7 @@
           <a:p>
             <a:fld id="{5D18DF3F-D54E-484E-889A-2AD7F8C273A7}" type="datetimeFigureOut">
               <a:rPr lang="en-US" smtClean="0"/>
-              <a:t>5/16/2024</a:t>
+              <a:t>5/17/2024</a:t>
             </a:fld>
             <a:endParaRPr lang="en-US"/>
           </a:p>
@@ -3396,6 +3410,729 @@
 </p:sld>
 </file>
 
+<file path=ppt/slides/slide10.xml><?xml version="1.0" encoding="utf-8"?>
+<p:sld xmlns:a="http://schemas.openxmlformats.org/drawingml/2006/main" xmlns:r="http://schemas.openxmlformats.org/officeDocument/2006/relationships" xmlns:p="http://schemas.openxmlformats.org/presentationml/2006/main">
+  <p:cSld>
+    <p:spTree>
+      <p:nvGrpSpPr>
+        <p:cNvPr id="1" name=""/>
+        <p:cNvGrpSpPr/>
+        <p:nvPr/>
+      </p:nvGrpSpPr>
+      <p:grpSpPr>
+        <a:xfrm>
+          <a:off x="0" y="0"/>
+          <a:ext cx="0" cy="0"/>
+          <a:chOff x="0" y="0"/>
+          <a:chExt cx="0" cy="0"/>
+        </a:xfrm>
+      </p:grpSpPr>
+      <p:sp>
+        <p:nvSpPr>
+          <p:cNvPr id="2" name="Title 1">
+            <a:extLst>
+              <a:ext uri="{FF2B5EF4-FFF2-40B4-BE49-F238E27FC236}">
+                <a16:creationId xmlns:a16="http://schemas.microsoft.com/office/drawing/2014/main" id="{397B02AC-944D-8028-23DA-6C7EE9680E4B}"/>
+              </a:ext>
+            </a:extLst>
+          </p:cNvPr>
+          <p:cNvSpPr>
+            <a:spLocks noGrp="1"/>
+          </p:cNvSpPr>
+          <p:nvPr>
+            <p:ph type="title"/>
+          </p:nvPr>
+        </p:nvSpPr>
+        <p:spPr/>
+        <p:txBody>
+          <a:bodyPr/>
+          <a:lstStyle/>
+          <a:p>
+            <a:r>
+              <a:rPr lang="en-US" dirty="0"/>
+              <a:t>What is the primary purpose of the </a:t>
+            </a:r>
+            <a:r>
+              <a:rPr lang="en-US" dirty="0" err="1"/>
+              <a:t>useRef</a:t>
+            </a:r>
+            <a:r>
+              <a:rPr lang="en-US" dirty="0"/>
+              <a:t> hook in React?</a:t>
+            </a:r>
+          </a:p>
+        </p:txBody>
+      </p:sp>
+      <p:sp>
+        <p:nvSpPr>
+          <p:cNvPr id="3" name="Content Placeholder 2">
+            <a:extLst>
+              <a:ext uri="{FF2B5EF4-FFF2-40B4-BE49-F238E27FC236}">
+                <a16:creationId xmlns:a16="http://schemas.microsoft.com/office/drawing/2014/main" id="{2D05E6D8-FF9B-FCA9-D594-A0F7B51D5919}"/>
+              </a:ext>
+            </a:extLst>
+          </p:cNvPr>
+          <p:cNvSpPr>
+            <a:spLocks noGrp="1"/>
+          </p:cNvSpPr>
+          <p:nvPr>
+            <p:ph idx="1"/>
+          </p:nvPr>
+        </p:nvSpPr>
+        <p:spPr/>
+        <p:txBody>
+          <a:bodyPr/>
+          <a:lstStyle/>
+          <a:p>
+            <a:r>
+              <a:rPr lang="en-US" dirty="0"/>
+              <a:t>A. To manage state in functional components</a:t>
+            </a:r>
+          </a:p>
+          <a:p>
+            <a:r>
+              <a:rPr lang="en-US" dirty="0"/>
+              <a:t>B. To handle side effects in functional components</a:t>
+            </a:r>
+          </a:p>
+          <a:p>
+            <a:r>
+              <a:rPr lang="en-US" dirty="0"/>
+              <a:t>C. To create a mutable reference that persists across renders</a:t>
+            </a:r>
+          </a:p>
+          <a:p>
+            <a:r>
+              <a:rPr lang="en-US" dirty="0"/>
+              <a:t>D. To pass data from parent to child components</a:t>
+            </a:r>
+          </a:p>
+        </p:txBody>
+      </p:sp>
+    </p:spTree>
+    <p:extLst>
+      <p:ext uri="{BB962C8B-B14F-4D97-AF65-F5344CB8AC3E}">
+        <p14:creationId xmlns:p14="http://schemas.microsoft.com/office/powerpoint/2010/main" val="842248568"/>
+      </p:ext>
+    </p:extLst>
+  </p:cSld>
+  <p:clrMapOvr>
+    <a:masterClrMapping/>
+  </p:clrMapOvr>
+</p:sld>
+</file>
+
+<file path=ppt/slides/slide11.xml><?xml version="1.0" encoding="utf-8"?>
+<p:sld xmlns:a="http://schemas.openxmlformats.org/drawingml/2006/main" xmlns:r="http://schemas.openxmlformats.org/officeDocument/2006/relationships" xmlns:p="http://schemas.openxmlformats.org/presentationml/2006/main">
+  <p:cSld>
+    <p:spTree>
+      <p:nvGrpSpPr>
+        <p:cNvPr id="1" name=""/>
+        <p:cNvGrpSpPr/>
+        <p:nvPr/>
+      </p:nvGrpSpPr>
+      <p:grpSpPr>
+        <a:xfrm>
+          <a:off x="0" y="0"/>
+          <a:ext cx="0" cy="0"/>
+          <a:chOff x="0" y="0"/>
+          <a:chExt cx="0" cy="0"/>
+        </a:xfrm>
+      </p:grpSpPr>
+      <p:sp>
+        <p:nvSpPr>
+          <p:cNvPr id="2" name="Title 1">
+            <a:extLst>
+              <a:ext uri="{FF2B5EF4-FFF2-40B4-BE49-F238E27FC236}">
+                <a16:creationId xmlns:a16="http://schemas.microsoft.com/office/drawing/2014/main" id="{1E452C22-0210-EC11-E342-F173B76071E6}"/>
+              </a:ext>
+            </a:extLst>
+          </p:cNvPr>
+          <p:cNvSpPr>
+            <a:spLocks noGrp="1"/>
+          </p:cNvSpPr>
+          <p:nvPr>
+            <p:ph type="title"/>
+          </p:nvPr>
+        </p:nvSpPr>
+        <p:spPr/>
+        <p:txBody>
+          <a:bodyPr/>
+          <a:lstStyle/>
+          <a:p>
+            <a:r>
+              <a:rPr lang="en-US" dirty="0"/>
+              <a:t>How can </a:t>
+            </a:r>
+            <a:r>
+              <a:rPr lang="en-US" dirty="0" err="1"/>
+              <a:t>useRef</a:t>
+            </a:r>
+            <a:r>
+              <a:rPr lang="en-US" dirty="0"/>
+              <a:t> be used in relation to DOM elements?</a:t>
+            </a:r>
+          </a:p>
+        </p:txBody>
+      </p:sp>
+      <p:sp>
+        <p:nvSpPr>
+          <p:cNvPr id="3" name="Content Placeholder 2">
+            <a:extLst>
+              <a:ext uri="{FF2B5EF4-FFF2-40B4-BE49-F238E27FC236}">
+                <a16:creationId xmlns:a16="http://schemas.microsoft.com/office/drawing/2014/main" id="{791A3B7B-5501-0855-52B6-8B138B15D9E0}"/>
+              </a:ext>
+            </a:extLst>
+          </p:cNvPr>
+          <p:cNvSpPr>
+            <a:spLocks noGrp="1"/>
+          </p:cNvSpPr>
+          <p:nvPr>
+            <p:ph idx="1"/>
+          </p:nvPr>
+        </p:nvSpPr>
+        <p:spPr/>
+        <p:txBody>
+          <a:bodyPr/>
+          <a:lstStyle/>
+          <a:p>
+            <a:r>
+              <a:rPr lang="en-US" dirty="0"/>
+              <a:t>A. To directly manipulate the state of a component</a:t>
+            </a:r>
+          </a:p>
+          <a:p>
+            <a:r>
+              <a:rPr lang="en-US" dirty="0"/>
+              <a:t>B. To keep track of previous state values</a:t>
+            </a:r>
+          </a:p>
+          <a:p>
+            <a:r>
+              <a:rPr lang="en-US" dirty="0"/>
+              <a:t>C. To store a reference to a DOM element for direct manipulation</a:t>
+            </a:r>
+          </a:p>
+          <a:p>
+            <a:r>
+              <a:rPr lang="en-US" dirty="0"/>
+              <a:t>D. To manage side effects</a:t>
+            </a:r>
+          </a:p>
+          <a:p>
+            <a:endParaRPr lang="en-US" dirty="0"/>
+          </a:p>
+        </p:txBody>
+      </p:sp>
+    </p:spTree>
+    <p:extLst>
+      <p:ext uri="{BB962C8B-B14F-4D97-AF65-F5344CB8AC3E}">
+        <p14:creationId xmlns:p14="http://schemas.microsoft.com/office/powerpoint/2010/main" val="4172200708"/>
+      </p:ext>
+    </p:extLst>
+  </p:cSld>
+  <p:clrMapOvr>
+    <a:masterClrMapping/>
+  </p:clrMapOvr>
+</p:sld>
+</file>
+
+<file path=ppt/slides/slide12.xml><?xml version="1.0" encoding="utf-8"?>
+<p:sld xmlns:a="http://schemas.openxmlformats.org/drawingml/2006/main" xmlns:r="http://schemas.openxmlformats.org/officeDocument/2006/relationships" xmlns:p="http://schemas.openxmlformats.org/presentationml/2006/main">
+  <p:cSld>
+    <p:spTree>
+      <p:nvGrpSpPr>
+        <p:cNvPr id="1" name=""/>
+        <p:cNvGrpSpPr/>
+        <p:nvPr/>
+      </p:nvGrpSpPr>
+      <p:grpSpPr>
+        <a:xfrm>
+          <a:off x="0" y="0"/>
+          <a:ext cx="0" cy="0"/>
+          <a:chOff x="0" y="0"/>
+          <a:chExt cx="0" cy="0"/>
+        </a:xfrm>
+      </p:grpSpPr>
+      <p:sp>
+        <p:nvSpPr>
+          <p:cNvPr id="2" name="Title 1">
+            <a:extLst>
+              <a:ext uri="{FF2B5EF4-FFF2-40B4-BE49-F238E27FC236}">
+                <a16:creationId xmlns:a16="http://schemas.microsoft.com/office/drawing/2014/main" id="{62E0351D-8634-32F3-6A97-6ADD7434E6F8}"/>
+              </a:ext>
+            </a:extLst>
+          </p:cNvPr>
+          <p:cNvSpPr>
+            <a:spLocks noGrp="1"/>
+          </p:cNvSpPr>
+          <p:nvPr>
+            <p:ph type="title"/>
+          </p:nvPr>
+        </p:nvSpPr>
+        <p:spPr/>
+        <p:txBody>
+          <a:bodyPr/>
+          <a:lstStyle/>
+          <a:p>
+            <a:r>
+              <a:rPr lang="en-US" dirty="0"/>
+              <a:t>Which of the following is true about the value returned by </a:t>
+            </a:r>
+            <a:r>
+              <a:rPr lang="en-US" dirty="0" err="1"/>
+              <a:t>useRef</a:t>
+            </a:r>
+            <a:r>
+              <a:rPr lang="en-US" dirty="0"/>
+              <a:t>?</a:t>
+            </a:r>
+          </a:p>
+        </p:txBody>
+      </p:sp>
+      <p:sp>
+        <p:nvSpPr>
+          <p:cNvPr id="3" name="Content Placeholder 2">
+            <a:extLst>
+              <a:ext uri="{FF2B5EF4-FFF2-40B4-BE49-F238E27FC236}">
+                <a16:creationId xmlns:a16="http://schemas.microsoft.com/office/drawing/2014/main" id="{F7C90C15-07B4-9D8F-851E-BE890BE5DF58}"/>
+              </a:ext>
+            </a:extLst>
+          </p:cNvPr>
+          <p:cNvSpPr>
+            <a:spLocks noGrp="1"/>
+          </p:cNvSpPr>
+          <p:nvPr>
+            <p:ph idx="1"/>
+          </p:nvPr>
+        </p:nvSpPr>
+        <p:spPr/>
+        <p:txBody>
+          <a:bodyPr/>
+          <a:lstStyle/>
+          <a:p>
+            <a:r>
+              <a:rPr lang="en-US" dirty="0"/>
+              <a:t>A. It is updated after every render</a:t>
+            </a:r>
+          </a:p>
+          <a:p>
+            <a:r>
+              <a:rPr lang="en-US" dirty="0"/>
+              <a:t>B. It is reinitialized after every render</a:t>
+            </a:r>
+          </a:p>
+          <a:p>
+            <a:r>
+              <a:rPr lang="en-US" dirty="0"/>
+              <a:t>C. It is a mutable object that does not cause re-renders when updated</a:t>
+            </a:r>
+          </a:p>
+          <a:p>
+            <a:r>
+              <a:rPr lang="en-US" dirty="0"/>
+              <a:t>D. It is a constant value that cannot be changed</a:t>
+            </a:r>
+          </a:p>
+          <a:p>
+            <a:endParaRPr lang="en-US" dirty="0"/>
+          </a:p>
+        </p:txBody>
+      </p:sp>
+    </p:spTree>
+    <p:extLst>
+      <p:ext uri="{BB962C8B-B14F-4D97-AF65-F5344CB8AC3E}">
+        <p14:creationId xmlns:p14="http://schemas.microsoft.com/office/powerpoint/2010/main" val="4092969140"/>
+      </p:ext>
+    </p:extLst>
+  </p:cSld>
+  <p:clrMapOvr>
+    <a:masterClrMapping/>
+  </p:clrMapOvr>
+</p:sld>
+</file>
+
+<file path=ppt/slides/slide13.xml><?xml version="1.0" encoding="utf-8"?>
+<p:sld xmlns:a="http://schemas.openxmlformats.org/drawingml/2006/main" xmlns:r="http://schemas.openxmlformats.org/officeDocument/2006/relationships" xmlns:p="http://schemas.openxmlformats.org/presentationml/2006/main">
+  <p:cSld>
+    <p:spTree>
+      <p:nvGrpSpPr>
+        <p:cNvPr id="1" name=""/>
+        <p:cNvGrpSpPr/>
+        <p:nvPr/>
+      </p:nvGrpSpPr>
+      <p:grpSpPr>
+        <a:xfrm>
+          <a:off x="0" y="0"/>
+          <a:ext cx="0" cy="0"/>
+          <a:chOff x="0" y="0"/>
+          <a:chExt cx="0" cy="0"/>
+        </a:xfrm>
+      </p:grpSpPr>
+      <p:sp>
+        <p:nvSpPr>
+          <p:cNvPr id="2" name="Title 1">
+            <a:extLst>
+              <a:ext uri="{FF2B5EF4-FFF2-40B4-BE49-F238E27FC236}">
+                <a16:creationId xmlns:a16="http://schemas.microsoft.com/office/drawing/2014/main" id="{51B59C2C-2ECA-0BCE-7709-F07071C1AF42}"/>
+              </a:ext>
+            </a:extLst>
+          </p:cNvPr>
+          <p:cNvSpPr>
+            <a:spLocks noGrp="1"/>
+          </p:cNvSpPr>
+          <p:nvPr>
+            <p:ph type="title"/>
+          </p:nvPr>
+        </p:nvSpPr>
+        <p:spPr/>
+        <p:txBody>
+          <a:bodyPr>
+            <a:normAutofit fontScale="90000"/>
+          </a:bodyPr>
+          <a:lstStyle/>
+          <a:p>
+            <a:r>
+              <a:rPr lang="en-US" dirty="0"/>
+              <a:t>Which hook would you use to persist a value across renders without causing a re-render when the value changes?</a:t>
+            </a:r>
+          </a:p>
+        </p:txBody>
+      </p:sp>
+      <p:sp>
+        <p:nvSpPr>
+          <p:cNvPr id="3" name="Content Placeholder 2">
+            <a:extLst>
+              <a:ext uri="{FF2B5EF4-FFF2-40B4-BE49-F238E27FC236}">
+                <a16:creationId xmlns:a16="http://schemas.microsoft.com/office/drawing/2014/main" id="{B2E726E7-4B12-FC05-AD9D-213345921A33}"/>
+              </a:ext>
+            </a:extLst>
+          </p:cNvPr>
+          <p:cNvSpPr>
+            <a:spLocks noGrp="1"/>
+          </p:cNvSpPr>
+          <p:nvPr>
+            <p:ph idx="1"/>
+          </p:nvPr>
+        </p:nvSpPr>
+        <p:spPr/>
+        <p:txBody>
+          <a:bodyPr/>
+          <a:lstStyle/>
+          <a:p>
+            <a:r>
+              <a:rPr lang="en-US" dirty="0"/>
+              <a:t>A. </a:t>
+            </a:r>
+            <a:r>
+              <a:rPr lang="en-US" dirty="0" err="1"/>
+              <a:t>useState</a:t>
+            </a:r>
+            <a:endParaRPr lang="en-US" dirty="0"/>
+          </a:p>
+          <a:p>
+            <a:r>
+              <a:rPr lang="en-US" dirty="0"/>
+              <a:t>B. </a:t>
+            </a:r>
+            <a:r>
+              <a:rPr lang="en-US" dirty="0" err="1"/>
+              <a:t>useEffect</a:t>
+            </a:r>
+            <a:endParaRPr lang="en-US" dirty="0"/>
+          </a:p>
+          <a:p>
+            <a:r>
+              <a:rPr lang="en-US" dirty="0"/>
+              <a:t>C. </a:t>
+            </a:r>
+            <a:r>
+              <a:rPr lang="en-US" dirty="0" err="1"/>
+              <a:t>useRef</a:t>
+            </a:r>
+            <a:endParaRPr lang="en-US" dirty="0"/>
+          </a:p>
+          <a:p>
+            <a:r>
+              <a:rPr lang="en-US" dirty="0"/>
+              <a:t>D. </a:t>
+            </a:r>
+            <a:r>
+              <a:rPr lang="en-US" dirty="0" err="1"/>
+              <a:t>useMemo</a:t>
+            </a:r>
+            <a:endParaRPr lang="en-US" dirty="0"/>
+          </a:p>
+        </p:txBody>
+      </p:sp>
+    </p:spTree>
+    <p:extLst>
+      <p:ext uri="{BB962C8B-B14F-4D97-AF65-F5344CB8AC3E}">
+        <p14:creationId xmlns:p14="http://schemas.microsoft.com/office/powerpoint/2010/main" val="113628053"/>
+      </p:ext>
+    </p:extLst>
+  </p:cSld>
+  <p:clrMapOvr>
+    <a:masterClrMapping/>
+  </p:clrMapOvr>
+</p:sld>
+</file>
+
+<file path=ppt/slides/slide14.xml><?xml version="1.0" encoding="utf-8"?>
+<p:sld xmlns:a="http://schemas.openxmlformats.org/drawingml/2006/main" xmlns:r="http://schemas.openxmlformats.org/officeDocument/2006/relationships" xmlns:p="http://schemas.openxmlformats.org/presentationml/2006/main">
+  <p:cSld>
+    <p:spTree>
+      <p:nvGrpSpPr>
+        <p:cNvPr id="1" name=""/>
+        <p:cNvGrpSpPr/>
+        <p:nvPr/>
+      </p:nvGrpSpPr>
+      <p:grpSpPr>
+        <a:xfrm>
+          <a:off x="0" y="0"/>
+          <a:ext cx="0" cy="0"/>
+          <a:chOff x="0" y="0"/>
+          <a:chExt cx="0" cy="0"/>
+        </a:xfrm>
+      </p:grpSpPr>
+      <p:sp>
+        <p:nvSpPr>
+          <p:cNvPr id="2" name="Title 1">
+            <a:extLst>
+              <a:ext uri="{FF2B5EF4-FFF2-40B4-BE49-F238E27FC236}">
+                <a16:creationId xmlns:a16="http://schemas.microsoft.com/office/drawing/2014/main" id="{38CC7B94-5F3B-DC7B-8279-94F8824B35D6}"/>
+              </a:ext>
+            </a:extLst>
+          </p:cNvPr>
+          <p:cNvSpPr>
+            <a:spLocks noGrp="1"/>
+          </p:cNvSpPr>
+          <p:nvPr>
+            <p:ph type="title"/>
+          </p:nvPr>
+        </p:nvSpPr>
+        <p:spPr/>
+        <p:txBody>
+          <a:bodyPr/>
+          <a:lstStyle/>
+          <a:p>
+            <a:r>
+              <a:rPr lang="en-US" dirty="0"/>
+              <a:t>Which hook is best suited for performing data fetching in a functional component?</a:t>
+            </a:r>
+          </a:p>
+        </p:txBody>
+      </p:sp>
+      <p:sp>
+        <p:nvSpPr>
+          <p:cNvPr id="3" name="Content Placeholder 2">
+            <a:extLst>
+              <a:ext uri="{FF2B5EF4-FFF2-40B4-BE49-F238E27FC236}">
+                <a16:creationId xmlns:a16="http://schemas.microsoft.com/office/drawing/2014/main" id="{49EC6B6B-3D71-AD4E-CAB0-0C64DFC19000}"/>
+              </a:ext>
+            </a:extLst>
+          </p:cNvPr>
+          <p:cNvSpPr>
+            <a:spLocks noGrp="1"/>
+          </p:cNvSpPr>
+          <p:nvPr>
+            <p:ph idx="1"/>
+          </p:nvPr>
+        </p:nvSpPr>
+        <p:spPr/>
+        <p:txBody>
+          <a:bodyPr/>
+          <a:lstStyle/>
+          <a:p>
+            <a:r>
+              <a:rPr lang="en-US" dirty="0"/>
+              <a:t>A. </a:t>
+            </a:r>
+            <a:r>
+              <a:rPr lang="en-US" dirty="0" err="1"/>
+              <a:t>useState</a:t>
+            </a:r>
+            <a:endParaRPr lang="en-US" dirty="0"/>
+          </a:p>
+          <a:p>
+            <a:r>
+              <a:rPr lang="en-US" dirty="0"/>
+              <a:t>B. </a:t>
+            </a:r>
+            <a:r>
+              <a:rPr lang="en-US" dirty="0" err="1"/>
+              <a:t>useEffect</a:t>
+            </a:r>
+            <a:endParaRPr lang="en-US" dirty="0"/>
+          </a:p>
+          <a:p>
+            <a:r>
+              <a:rPr lang="en-US" dirty="0"/>
+              <a:t>C. </a:t>
+            </a:r>
+            <a:r>
+              <a:rPr lang="en-US" dirty="0" err="1"/>
+              <a:t>useRef</a:t>
+            </a:r>
+            <a:endParaRPr lang="en-US" dirty="0"/>
+          </a:p>
+          <a:p>
+            <a:r>
+              <a:rPr lang="en-US" dirty="0"/>
+              <a:t>D. </a:t>
+            </a:r>
+            <a:r>
+              <a:rPr lang="en-US" dirty="0" err="1"/>
+              <a:t>useReducer</a:t>
+            </a:r>
+            <a:endParaRPr lang="en-US" dirty="0"/>
+          </a:p>
+          <a:p>
+            <a:endParaRPr lang="en-US" dirty="0"/>
+          </a:p>
+        </p:txBody>
+      </p:sp>
+    </p:spTree>
+    <p:extLst>
+      <p:ext uri="{BB962C8B-B14F-4D97-AF65-F5344CB8AC3E}">
+        <p14:creationId xmlns:p14="http://schemas.microsoft.com/office/powerpoint/2010/main" val="1160462544"/>
+      </p:ext>
+    </p:extLst>
+  </p:cSld>
+  <p:clrMapOvr>
+    <a:masterClrMapping/>
+  </p:clrMapOvr>
+</p:sld>
+</file>
+
+<file path=ppt/slides/slide15.xml><?xml version="1.0" encoding="utf-8"?>
+<p:sld xmlns:a="http://schemas.openxmlformats.org/drawingml/2006/main" xmlns:r="http://schemas.openxmlformats.org/officeDocument/2006/relationships" xmlns:p="http://schemas.openxmlformats.org/presentationml/2006/main">
+  <p:cSld>
+    <p:spTree>
+      <p:nvGrpSpPr>
+        <p:cNvPr id="1" name=""/>
+        <p:cNvGrpSpPr/>
+        <p:nvPr/>
+      </p:nvGrpSpPr>
+      <p:grpSpPr>
+        <a:xfrm>
+          <a:off x="0" y="0"/>
+          <a:ext cx="0" cy="0"/>
+          <a:chOff x="0" y="0"/>
+          <a:chExt cx="0" cy="0"/>
+        </a:xfrm>
+      </p:grpSpPr>
+      <p:sp>
+        <p:nvSpPr>
+          <p:cNvPr id="2" name="Title 1">
+            <a:extLst>
+              <a:ext uri="{FF2B5EF4-FFF2-40B4-BE49-F238E27FC236}">
+                <a16:creationId xmlns:a16="http://schemas.microsoft.com/office/drawing/2014/main" id="{4896B2BC-C8EC-8DFB-8737-D080796C0836}"/>
+              </a:ext>
+            </a:extLst>
+          </p:cNvPr>
+          <p:cNvSpPr>
+            <a:spLocks noGrp="1"/>
+          </p:cNvSpPr>
+          <p:nvPr>
+            <p:ph type="title"/>
+          </p:nvPr>
+        </p:nvSpPr>
+        <p:spPr/>
+        <p:txBody>
+          <a:bodyPr/>
+          <a:lstStyle/>
+          <a:p>
+            <a:r>
+              <a:rPr lang="en-US" dirty="0"/>
+              <a:t>What is the purpose of </a:t>
+            </a:r>
+            <a:r>
+              <a:rPr lang="en-US"/>
+              <a:t>the “</a:t>
+            </a:r>
+            <a:r>
+              <a:rPr lang="en-US" b="1" i="1"/>
+              <a:t>then”</a:t>
+            </a:r>
+            <a:r>
+              <a:rPr lang="en-US"/>
+              <a:t> </a:t>
+            </a:r>
+            <a:r>
+              <a:rPr lang="en-US" dirty="0"/>
+              <a:t>method when making an API call with </a:t>
+            </a:r>
+            <a:r>
+              <a:rPr lang="en-US" dirty="0" err="1"/>
+              <a:t>Axios</a:t>
+            </a:r>
+            <a:r>
+              <a:rPr lang="en-US" dirty="0"/>
+              <a:t>?</a:t>
+            </a:r>
+          </a:p>
+        </p:txBody>
+      </p:sp>
+      <p:sp>
+        <p:nvSpPr>
+          <p:cNvPr id="3" name="Content Placeholder 2">
+            <a:extLst>
+              <a:ext uri="{FF2B5EF4-FFF2-40B4-BE49-F238E27FC236}">
+                <a16:creationId xmlns:a16="http://schemas.microsoft.com/office/drawing/2014/main" id="{BDFF3786-C092-1228-3B30-1FACA655A62B}"/>
+              </a:ext>
+            </a:extLst>
+          </p:cNvPr>
+          <p:cNvSpPr>
+            <a:spLocks noGrp="1"/>
+          </p:cNvSpPr>
+          <p:nvPr>
+            <p:ph idx="1"/>
+          </p:nvPr>
+        </p:nvSpPr>
+        <p:spPr/>
+        <p:txBody>
+          <a:bodyPr/>
+          <a:lstStyle/>
+          <a:p>
+            <a:r>
+              <a:rPr lang="en-US" dirty="0"/>
+              <a:t>A. To handle errors in the API call</a:t>
+            </a:r>
+          </a:p>
+          <a:p>
+            <a:r>
+              <a:rPr lang="en-US" dirty="0"/>
+              <a:t>B. To handle the response from the API call</a:t>
+            </a:r>
+          </a:p>
+          <a:p>
+            <a:r>
+              <a:rPr lang="en-US" dirty="0"/>
+              <a:t>C. To configure the API endpoint</a:t>
+            </a:r>
+          </a:p>
+          <a:p>
+            <a:r>
+              <a:rPr lang="en-US" dirty="0"/>
+              <a:t>D. To set headers for the API call</a:t>
+            </a:r>
+          </a:p>
+        </p:txBody>
+      </p:sp>
+    </p:spTree>
+    <p:extLst>
+      <p:ext uri="{BB962C8B-B14F-4D97-AF65-F5344CB8AC3E}">
+        <p14:creationId xmlns:p14="http://schemas.microsoft.com/office/powerpoint/2010/main" val="1669919032"/>
+      </p:ext>
+    </p:extLst>
+  </p:cSld>
+  <p:clrMapOvr>
+    <a:masterClrMapping/>
+  </p:clrMapOvr>
+</p:sld>
+</file>
+
 <file path=ppt/slides/slide2.xml><?xml version="1.0" encoding="utf-8"?>
 <p:sld xmlns:a="http://schemas.openxmlformats.org/drawingml/2006/main" xmlns:r="http://schemas.openxmlformats.org/officeDocument/2006/relationships" xmlns:p="http://schemas.openxmlformats.org/presentationml/2006/main">
   <p:cSld>
@@ -4075,7 +4812,10 @@
           <a:bodyPr/>
           <a:lstStyle/>
           <a:p>
-            <a:endParaRPr lang="en-US"/>
+            <a:r>
+              <a:rPr lang="en-US" dirty="0"/>
+              <a:t>Which hook is used to manage state in a React functional component?</a:t>
+            </a:r>
           </a:p>
         </p:txBody>
       </p:sp>
@@ -4100,7 +4840,48 @@
           <a:bodyPr/>
           <a:lstStyle/>
           <a:p>
-            <a:endParaRPr lang="en-US"/>
+            <a:r>
+              <a:rPr lang="en-US" dirty="0"/>
+              <a:t>A. </a:t>
+            </a:r>
+            <a:r>
+              <a:rPr lang="en-US" dirty="0" err="1"/>
+              <a:t>useEffect</a:t>
+            </a:r>
+            <a:endParaRPr lang="en-US" dirty="0"/>
+          </a:p>
+          <a:p>
+            <a:r>
+              <a:rPr lang="en-US" dirty="0"/>
+              <a:t>B. </a:t>
+            </a:r>
+            <a:r>
+              <a:rPr lang="en-US" dirty="0" err="1"/>
+              <a:t>useState</a:t>
+            </a:r>
+            <a:endParaRPr lang="en-US" dirty="0"/>
+          </a:p>
+          <a:p>
+            <a:r>
+              <a:rPr lang="en-US" dirty="0"/>
+              <a:t>C. </a:t>
+            </a:r>
+            <a:r>
+              <a:rPr lang="en-US" dirty="0" err="1"/>
+              <a:t>useContext</a:t>
+            </a:r>
+            <a:endParaRPr lang="en-US" dirty="0"/>
+          </a:p>
+          <a:p>
+            <a:r>
+              <a:rPr lang="en-US" dirty="0"/>
+              <a:t>D. </a:t>
+            </a:r>
+            <a:r>
+              <a:rPr lang="en-US" dirty="0" err="1"/>
+              <a:t>useReducer</a:t>
+            </a:r>
+            <a:endParaRPr lang="en-US" dirty="0"/>
           </a:p>
         </p:txBody>
       </p:sp>
@@ -4108,6 +4889,348 @@
     <p:extLst>
       <p:ext uri="{BB962C8B-B14F-4D97-AF65-F5344CB8AC3E}">
         <p14:creationId xmlns:p14="http://schemas.microsoft.com/office/powerpoint/2010/main" val="3464233619"/>
+      </p:ext>
+    </p:extLst>
+  </p:cSld>
+  <p:clrMapOvr>
+    <a:masterClrMapping/>
+  </p:clrMapOvr>
+</p:sld>
+</file>
+
+<file path=ppt/slides/slide7.xml><?xml version="1.0" encoding="utf-8"?>
+<p:sld xmlns:a="http://schemas.openxmlformats.org/drawingml/2006/main" xmlns:r="http://schemas.openxmlformats.org/officeDocument/2006/relationships" xmlns:p="http://schemas.openxmlformats.org/presentationml/2006/main">
+  <p:cSld>
+    <p:spTree>
+      <p:nvGrpSpPr>
+        <p:cNvPr id="1" name=""/>
+        <p:cNvGrpSpPr/>
+        <p:nvPr/>
+      </p:nvGrpSpPr>
+      <p:grpSpPr>
+        <a:xfrm>
+          <a:off x="0" y="0"/>
+          <a:ext cx="0" cy="0"/>
+          <a:chOff x="0" y="0"/>
+          <a:chExt cx="0" cy="0"/>
+        </a:xfrm>
+      </p:grpSpPr>
+      <p:sp>
+        <p:nvSpPr>
+          <p:cNvPr id="2" name="Title 1">
+            <a:extLst>
+              <a:ext uri="{FF2B5EF4-FFF2-40B4-BE49-F238E27FC236}">
+                <a16:creationId xmlns:a16="http://schemas.microsoft.com/office/drawing/2014/main" id="{55C1AC24-AE89-CD4A-490A-A26CE1E90D7C}"/>
+              </a:ext>
+            </a:extLst>
+          </p:cNvPr>
+          <p:cNvSpPr>
+            <a:spLocks noGrp="1"/>
+          </p:cNvSpPr>
+          <p:nvPr>
+            <p:ph type="title"/>
+          </p:nvPr>
+        </p:nvSpPr>
+        <p:spPr/>
+        <p:txBody>
+          <a:bodyPr/>
+          <a:lstStyle/>
+          <a:p>
+            <a:r>
+              <a:rPr lang="en-US" dirty="0"/>
+              <a:t>What does the </a:t>
+            </a:r>
+            <a:r>
+              <a:rPr lang="en-US" dirty="0" err="1"/>
+              <a:t>useState</a:t>
+            </a:r>
+            <a:r>
+              <a:rPr lang="en-US" dirty="0"/>
+              <a:t> hook return?</a:t>
+            </a:r>
+          </a:p>
+        </p:txBody>
+      </p:sp>
+      <p:sp>
+        <p:nvSpPr>
+          <p:cNvPr id="3" name="Content Placeholder 2">
+            <a:extLst>
+              <a:ext uri="{FF2B5EF4-FFF2-40B4-BE49-F238E27FC236}">
+                <a16:creationId xmlns:a16="http://schemas.microsoft.com/office/drawing/2014/main" id="{DD40BE20-F612-EE4B-C8C2-B95DA89E9233}"/>
+              </a:ext>
+            </a:extLst>
+          </p:cNvPr>
+          <p:cNvSpPr>
+            <a:spLocks noGrp="1"/>
+          </p:cNvSpPr>
+          <p:nvPr>
+            <p:ph idx="1"/>
+          </p:nvPr>
+        </p:nvSpPr>
+        <p:spPr/>
+        <p:txBody>
+          <a:bodyPr/>
+          <a:lstStyle/>
+          <a:p>
+            <a:r>
+              <a:rPr lang="en-US" dirty="0"/>
+              <a:t>A. A state value and a function to update it</a:t>
+            </a:r>
+          </a:p>
+          <a:p>
+            <a:r>
+              <a:rPr lang="en-US" dirty="0"/>
+              <a:t>B. A state value and a function to reset it</a:t>
+            </a:r>
+          </a:p>
+          <a:p>
+            <a:r>
+              <a:rPr lang="en-US" dirty="0"/>
+              <a:t>C. A state value and a reference to the previous state</a:t>
+            </a:r>
+          </a:p>
+          <a:p>
+            <a:r>
+              <a:rPr lang="en-US" dirty="0"/>
+              <a:t>D. A state value and a function to render it</a:t>
+            </a:r>
+          </a:p>
+        </p:txBody>
+      </p:sp>
+    </p:spTree>
+    <p:extLst>
+      <p:ext uri="{BB962C8B-B14F-4D97-AF65-F5344CB8AC3E}">
+        <p14:creationId xmlns:p14="http://schemas.microsoft.com/office/powerpoint/2010/main" val="2381740075"/>
+      </p:ext>
+    </p:extLst>
+  </p:cSld>
+  <p:clrMapOvr>
+    <a:masterClrMapping/>
+  </p:clrMapOvr>
+</p:sld>
+</file>
+
+<file path=ppt/slides/slide8.xml><?xml version="1.0" encoding="utf-8"?>
+<p:sld xmlns:a="http://schemas.openxmlformats.org/drawingml/2006/main" xmlns:r="http://schemas.openxmlformats.org/officeDocument/2006/relationships" xmlns:p="http://schemas.openxmlformats.org/presentationml/2006/main">
+  <p:cSld>
+    <p:spTree>
+      <p:nvGrpSpPr>
+        <p:cNvPr id="1" name=""/>
+        <p:cNvGrpSpPr/>
+        <p:nvPr/>
+      </p:nvGrpSpPr>
+      <p:grpSpPr>
+        <a:xfrm>
+          <a:off x="0" y="0"/>
+          <a:ext cx="0" cy="0"/>
+          <a:chOff x="0" y="0"/>
+          <a:chExt cx="0" cy="0"/>
+        </a:xfrm>
+      </p:grpSpPr>
+      <p:sp>
+        <p:nvSpPr>
+          <p:cNvPr id="2" name="Title 1">
+            <a:extLst>
+              <a:ext uri="{FF2B5EF4-FFF2-40B4-BE49-F238E27FC236}">
+                <a16:creationId xmlns:a16="http://schemas.microsoft.com/office/drawing/2014/main" id="{8C078554-C3F6-D826-3695-42ACBBCF2D21}"/>
+              </a:ext>
+            </a:extLst>
+          </p:cNvPr>
+          <p:cNvSpPr>
+            <a:spLocks noGrp="1"/>
+          </p:cNvSpPr>
+          <p:nvPr>
+            <p:ph type="title"/>
+          </p:nvPr>
+        </p:nvSpPr>
+        <p:spPr/>
+        <p:txBody>
+          <a:bodyPr/>
+          <a:lstStyle/>
+          <a:p>
+            <a:r>
+              <a:rPr lang="en-US" dirty="0"/>
+              <a:t>What is the primary purpose of the </a:t>
+            </a:r>
+            <a:r>
+              <a:rPr lang="en-US" dirty="0" err="1"/>
+              <a:t>useEffect</a:t>
+            </a:r>
+            <a:r>
+              <a:rPr lang="en-US" dirty="0"/>
+              <a:t> hook in React?</a:t>
+            </a:r>
+          </a:p>
+        </p:txBody>
+      </p:sp>
+      <p:sp>
+        <p:nvSpPr>
+          <p:cNvPr id="3" name="Content Placeholder 2">
+            <a:extLst>
+              <a:ext uri="{FF2B5EF4-FFF2-40B4-BE49-F238E27FC236}">
+                <a16:creationId xmlns:a16="http://schemas.microsoft.com/office/drawing/2014/main" id="{7B6BD7C6-93F8-7328-3E59-B265315D9E84}"/>
+              </a:ext>
+            </a:extLst>
+          </p:cNvPr>
+          <p:cNvSpPr>
+            <a:spLocks noGrp="1"/>
+          </p:cNvSpPr>
+          <p:nvPr>
+            <p:ph idx="1"/>
+          </p:nvPr>
+        </p:nvSpPr>
+        <p:spPr/>
+        <p:txBody>
+          <a:bodyPr/>
+          <a:lstStyle/>
+          <a:p>
+            <a:r>
+              <a:rPr lang="en-US" dirty="0"/>
+              <a:t>A. To manage state in functional components</a:t>
+            </a:r>
+          </a:p>
+          <a:p>
+            <a:r>
+              <a:rPr lang="en-US" dirty="0"/>
+              <a:t>B. To handle side effects in functional components</a:t>
+            </a:r>
+          </a:p>
+          <a:p>
+            <a:r>
+              <a:rPr lang="en-US" dirty="0"/>
+              <a:t>C. To reference DOM elements directly</a:t>
+            </a:r>
+          </a:p>
+          <a:p>
+            <a:r>
+              <a:rPr lang="en-US" dirty="0"/>
+              <a:t>D. To create context in functional components</a:t>
+            </a:r>
+          </a:p>
+          <a:p>
+            <a:endParaRPr lang="en-US" dirty="0"/>
+          </a:p>
+        </p:txBody>
+      </p:sp>
+    </p:spTree>
+    <p:extLst>
+      <p:ext uri="{BB962C8B-B14F-4D97-AF65-F5344CB8AC3E}">
+        <p14:creationId xmlns:p14="http://schemas.microsoft.com/office/powerpoint/2010/main" val="2064514248"/>
+      </p:ext>
+    </p:extLst>
+  </p:cSld>
+  <p:clrMapOvr>
+    <a:masterClrMapping/>
+  </p:clrMapOvr>
+</p:sld>
+</file>
+
+<file path=ppt/slides/slide9.xml><?xml version="1.0" encoding="utf-8"?>
+<p:sld xmlns:a="http://schemas.openxmlformats.org/drawingml/2006/main" xmlns:r="http://schemas.openxmlformats.org/officeDocument/2006/relationships" xmlns:p="http://schemas.openxmlformats.org/presentationml/2006/main">
+  <p:cSld>
+    <p:spTree>
+      <p:nvGrpSpPr>
+        <p:cNvPr id="1" name=""/>
+        <p:cNvGrpSpPr/>
+        <p:nvPr/>
+      </p:nvGrpSpPr>
+      <p:grpSpPr>
+        <a:xfrm>
+          <a:off x="0" y="0"/>
+          <a:ext cx="0" cy="0"/>
+          <a:chOff x="0" y="0"/>
+          <a:chExt cx="0" cy="0"/>
+        </a:xfrm>
+      </p:grpSpPr>
+      <p:sp>
+        <p:nvSpPr>
+          <p:cNvPr id="2" name="Title 1">
+            <a:extLst>
+              <a:ext uri="{FF2B5EF4-FFF2-40B4-BE49-F238E27FC236}">
+                <a16:creationId xmlns:a16="http://schemas.microsoft.com/office/drawing/2014/main" id="{C8B202CF-A274-ACD4-7700-7B9A0BD278D8}"/>
+              </a:ext>
+            </a:extLst>
+          </p:cNvPr>
+          <p:cNvSpPr>
+            <a:spLocks noGrp="1"/>
+          </p:cNvSpPr>
+          <p:nvPr>
+            <p:ph type="title"/>
+          </p:nvPr>
+        </p:nvSpPr>
+        <p:spPr/>
+        <p:txBody>
+          <a:bodyPr/>
+          <a:lstStyle/>
+          <a:p>
+            <a:r>
+              <a:rPr lang="en-US" dirty="0"/>
+              <a:t>When does the </a:t>
+            </a:r>
+            <a:r>
+              <a:rPr lang="en-US" dirty="0" err="1"/>
+              <a:t>useEffect</a:t>
+            </a:r>
+            <a:r>
+              <a:rPr lang="en-US" dirty="0"/>
+              <a:t> hook run if an empty dependency array is passed?</a:t>
+            </a:r>
+          </a:p>
+        </p:txBody>
+      </p:sp>
+      <p:sp>
+        <p:nvSpPr>
+          <p:cNvPr id="3" name="Content Placeholder 2">
+            <a:extLst>
+              <a:ext uri="{FF2B5EF4-FFF2-40B4-BE49-F238E27FC236}">
+                <a16:creationId xmlns:a16="http://schemas.microsoft.com/office/drawing/2014/main" id="{A851EA8D-0274-A652-48D0-E5F5049C987E}"/>
+              </a:ext>
+            </a:extLst>
+          </p:cNvPr>
+          <p:cNvSpPr>
+            <a:spLocks noGrp="1"/>
+          </p:cNvSpPr>
+          <p:nvPr>
+            <p:ph idx="1"/>
+          </p:nvPr>
+        </p:nvSpPr>
+        <p:spPr/>
+        <p:txBody>
+          <a:bodyPr/>
+          <a:lstStyle/>
+          <a:p>
+            <a:r>
+              <a:rPr lang="en-US" dirty="0"/>
+              <a:t>A. On every render</a:t>
+            </a:r>
+          </a:p>
+          <a:p>
+            <a:r>
+              <a:rPr lang="en-US" dirty="0"/>
+              <a:t>B. Only once after the initial render</a:t>
+            </a:r>
+          </a:p>
+          <a:p>
+            <a:r>
+              <a:rPr lang="en-US" dirty="0"/>
+              <a:t>C. Only when the component unmounts</a:t>
+            </a:r>
+          </a:p>
+          <a:p>
+            <a:r>
+              <a:rPr lang="en-US" dirty="0"/>
+              <a:t>D. On every render and when the component unmounts</a:t>
+            </a:r>
+          </a:p>
+          <a:p>
+            <a:endParaRPr lang="en-US" dirty="0"/>
+          </a:p>
+        </p:txBody>
+      </p:sp>
+    </p:spTree>
+    <p:extLst>
+      <p:ext uri="{BB962C8B-B14F-4D97-AF65-F5344CB8AC3E}">
+        <p14:creationId xmlns:p14="http://schemas.microsoft.com/office/powerpoint/2010/main" val="936524250"/>
       </p:ext>
     </p:extLst>
   </p:cSld>

</xml_diff>